<commit_message>
slides with percentages animation:: by sergio giraldo @ 20230312T1221CET, gpg signed
</commit_message>
<xml_diff>
--- a/powerpoint/Percentage.pptx
+++ b/powerpoint/Percentage.pptx
@@ -3836,10 +3836,10 @@
       </p:grpSp>
       <p:grpSp>
         <p:nvGrpSpPr>
-          <p:cNvPr id="20" name="70">
-            <a:extLst>
-              <a:ext uri="{FF2B5EF4-FFF2-40B4-BE49-F238E27FC236}">
-                <a16:creationId xmlns:a16="http://schemas.microsoft.com/office/drawing/2014/main" id="{500CCDAB-4595-919E-8B8B-7DA7DD12D8DA}"/>
+          <p:cNvPr id="31" name="70">
+            <a:extLst>
+              <a:ext uri="{FF2B5EF4-FFF2-40B4-BE49-F238E27FC236}">
+                <a16:creationId xmlns:a16="http://schemas.microsoft.com/office/drawing/2014/main" id="{EC45795F-CAF6-5C9B-5E3C-32A091D4C9D0}"/>
               </a:ext>
             </a:extLst>
           </p:cNvPr>
@@ -4324,7 +4324,7 @@
         </p:nvSpPr>
         <p:spPr>
           <a:xfrm>
-            <a:off x="1599794" y="4468264"/>
+            <a:off x="1599794" y="4457378"/>
             <a:ext cx="8929725" cy="1413863"/>
           </a:xfrm>
           <a:prstGeom prst="rect">
@@ -4362,12 +4362,596 @@
           </a:p>
         </p:txBody>
       </p:sp>
-      <p:sp>
-        <p:nvSpPr>
-          <p:cNvPr id="23" name="TextBox 22">
-            <a:extLst>
-              <a:ext uri="{FF2B5EF4-FFF2-40B4-BE49-F238E27FC236}">
-                <a16:creationId xmlns:a16="http://schemas.microsoft.com/office/drawing/2014/main" id="{A038AB9A-1FFC-322B-39AA-87D5FA85B3D9}"/>
+      <p:grpSp>
+        <p:nvGrpSpPr>
+          <p:cNvPr id="33" name="Group 32">
+            <a:extLst>
+              <a:ext uri="{FF2B5EF4-FFF2-40B4-BE49-F238E27FC236}">
+                <a16:creationId xmlns:a16="http://schemas.microsoft.com/office/drawing/2014/main" id="{39F8CD39-4A30-AC6E-C99E-BAA4DBCA44C6}"/>
+              </a:ext>
+            </a:extLst>
+          </p:cNvPr>
+          <p:cNvGrpSpPr/>
+          <p:nvPr/>
+        </p:nvGrpSpPr>
+        <p:grpSpPr>
+          <a:xfrm>
+            <a:off x="1599794" y="4191000"/>
+            <a:ext cx="2166427" cy="1142964"/>
+            <a:chOff x="1599794" y="4191000"/>
+            <a:chExt cx="2166427" cy="1142964"/>
+          </a:xfrm>
+        </p:grpSpPr>
+        <p:sp>
+          <p:nvSpPr>
+            <p:cNvPr id="23" name="TextBox 22">
+              <a:extLst>
+                <a:ext uri="{FF2B5EF4-FFF2-40B4-BE49-F238E27FC236}">
+                  <a16:creationId xmlns:a16="http://schemas.microsoft.com/office/drawing/2014/main" id="{A038AB9A-1FFC-322B-39AA-87D5FA85B3D9}"/>
+                </a:ext>
+              </a:extLst>
+            </p:cNvPr>
+            <p:cNvSpPr txBox="1"/>
+            <p:nvPr/>
+          </p:nvSpPr>
+          <p:spPr>
+            <a:xfrm>
+              <a:off x="2394856" y="4191000"/>
+              <a:ext cx="583814" cy="369332"/>
+            </a:xfrm>
+            <a:prstGeom prst="rect">
+              <a:avLst/>
+            </a:prstGeom>
+            <a:noFill/>
+          </p:spPr>
+          <p:txBody>
+            <a:bodyPr wrap="none" rtlCol="0">
+              <a:spAutoFit/>
+            </a:bodyPr>
+            <a:lstStyle/>
+            <a:p>
+              <a:r>
+                <a:rPr lang="en-NL" dirty="0">
+                  <a:solidFill>
+                    <a:srgbClr val="D67D3E"/>
+                  </a:solidFill>
+                </a:rPr>
+                <a:t>30%</a:t>
+              </a:r>
+            </a:p>
+          </p:txBody>
+        </p:sp>
+        <p:sp>
+          <p:nvSpPr>
+            <p:cNvPr id="27" name="Design">
+              <a:extLst>
+                <a:ext uri="{FF2B5EF4-FFF2-40B4-BE49-F238E27FC236}">
+                  <a16:creationId xmlns:a16="http://schemas.microsoft.com/office/drawing/2014/main" id="{F00ADE21-6197-96DC-F6D2-B88581AF89A8}"/>
+                </a:ext>
+              </a:extLst>
+            </p:cNvPr>
+            <p:cNvSpPr txBox="1"/>
+            <p:nvPr/>
+          </p:nvSpPr>
+          <p:spPr>
+            <a:xfrm>
+              <a:off x="1599794" y="4595300"/>
+              <a:ext cx="2166427" cy="738664"/>
+            </a:xfrm>
+            <a:prstGeom prst="rect">
+              <a:avLst/>
+            </a:prstGeom>
+            <a:noFill/>
+          </p:spPr>
+          <p:txBody>
+            <a:bodyPr wrap="none" rtlCol="0">
+              <a:spAutoFit/>
+            </a:bodyPr>
+            <a:lstStyle/>
+            <a:p>
+              <a:pPr algn="ctr"/>
+              <a:r>
+                <a:rPr lang="en-NL" b="1" i="1" dirty="0">
+                  <a:latin typeface="Avenir Black Oblique" panose="02000503020000020003" pitchFamily="2" charset="0"/>
+                </a:rPr>
+                <a:t>DESIGN</a:t>
+              </a:r>
+            </a:p>
+            <a:p>
+              <a:pPr algn="ctr"/>
+              <a:r>
+                <a:rPr lang="en-GB" sz="1200" dirty="0">
+                  <a:latin typeface="Avenir Medium" panose="02000503020000020003" pitchFamily="2" charset="0"/>
+                </a:rPr>
+                <a:t>Lorem ipsum dolor sit </a:t>
+              </a:r>
+              <a:r>
+                <a:rPr lang="en-GB" sz="1200" dirty="0" err="1">
+                  <a:latin typeface="Avenir Medium" panose="02000503020000020003" pitchFamily="2" charset="0"/>
+                </a:rPr>
+                <a:t>amet</a:t>
+              </a:r>
+              <a:endParaRPr lang="en-GB" sz="1200" dirty="0">
+                <a:latin typeface="Avenir Medium" panose="02000503020000020003" pitchFamily="2" charset="0"/>
+              </a:endParaRPr>
+            </a:p>
+            <a:p>
+              <a:pPr algn="ctr"/>
+              <a:r>
+                <a:rPr lang="en-GB" sz="1200" dirty="0">
+                  <a:latin typeface="Avenir Medium" panose="02000503020000020003" pitchFamily="2" charset="0"/>
+                </a:rPr>
+                <a:t>Nunc viverra </a:t>
+              </a:r>
+              <a:r>
+                <a:rPr lang="en-GB" sz="1200" dirty="0" err="1">
+                  <a:latin typeface="Avenir Medium" panose="02000503020000020003" pitchFamily="2" charset="0"/>
+                </a:rPr>
+                <a:t>imperdiet</a:t>
+              </a:r>
+              <a:r>
+                <a:rPr lang="en-GB" sz="1200" dirty="0">
+                  <a:latin typeface="Avenir Medium" panose="02000503020000020003" pitchFamily="2" charset="0"/>
+                </a:rPr>
+                <a:t> </a:t>
+              </a:r>
+              <a:r>
+                <a:rPr lang="en-GB" sz="1200" dirty="0" err="1">
+                  <a:latin typeface="Avenir Medium" panose="02000503020000020003" pitchFamily="2" charset="0"/>
+                </a:rPr>
+                <a:t>enim</a:t>
+              </a:r>
+              <a:endParaRPr lang="en-NL" sz="1200" dirty="0">
+                <a:latin typeface="Avenir Medium" panose="02000503020000020003" pitchFamily="2" charset="0"/>
+              </a:endParaRPr>
+            </a:p>
+          </p:txBody>
+        </p:sp>
+      </p:grpSp>
+      <p:grpSp>
+        <p:nvGrpSpPr>
+          <p:cNvPr id="34" name="Group 33">
+            <a:extLst>
+              <a:ext uri="{FF2B5EF4-FFF2-40B4-BE49-F238E27FC236}">
+                <a16:creationId xmlns:a16="http://schemas.microsoft.com/office/drawing/2014/main" id="{068AEAD9-1741-C761-50C3-DF7850294239}"/>
+              </a:ext>
+            </a:extLst>
+          </p:cNvPr>
+          <p:cNvGrpSpPr/>
+          <p:nvPr/>
+        </p:nvGrpSpPr>
+        <p:grpSpPr>
+          <a:xfrm>
+            <a:off x="3853137" y="4225969"/>
+            <a:ext cx="2166427" cy="1107995"/>
+            <a:chOff x="3853137" y="4225969"/>
+            <a:chExt cx="2166427" cy="1107995"/>
+          </a:xfrm>
+        </p:grpSpPr>
+        <p:sp>
+          <p:nvSpPr>
+            <p:cNvPr id="24" name="TextBox 23">
+              <a:extLst>
+                <a:ext uri="{FF2B5EF4-FFF2-40B4-BE49-F238E27FC236}">
+                  <a16:creationId xmlns:a16="http://schemas.microsoft.com/office/drawing/2014/main" id="{65236C97-4095-384F-E52F-1C08C11EEF03}"/>
+                </a:ext>
+              </a:extLst>
+            </p:cNvPr>
+            <p:cNvSpPr txBox="1"/>
+            <p:nvPr/>
+          </p:nvSpPr>
+          <p:spPr>
+            <a:xfrm>
+              <a:off x="4644444" y="4225969"/>
+              <a:ext cx="583814" cy="369332"/>
+            </a:xfrm>
+            <a:prstGeom prst="rect">
+              <a:avLst/>
+            </a:prstGeom>
+            <a:noFill/>
+          </p:spPr>
+          <p:txBody>
+            <a:bodyPr wrap="none" rtlCol="0">
+              <a:spAutoFit/>
+            </a:bodyPr>
+            <a:lstStyle/>
+            <a:p>
+              <a:r>
+                <a:rPr lang="en-NL" dirty="0">
+                  <a:solidFill>
+                    <a:srgbClr val="9F0F48"/>
+                  </a:solidFill>
+                </a:rPr>
+                <a:t>45%</a:t>
+              </a:r>
+            </a:p>
+          </p:txBody>
+        </p:sp>
+        <p:sp>
+          <p:nvSpPr>
+            <p:cNvPr id="28" name="Software">
+              <a:extLst>
+                <a:ext uri="{FF2B5EF4-FFF2-40B4-BE49-F238E27FC236}">
+                  <a16:creationId xmlns:a16="http://schemas.microsoft.com/office/drawing/2014/main" id="{C1C4479E-17C9-1584-EC97-D0C72249FA79}"/>
+                </a:ext>
+              </a:extLst>
+            </p:cNvPr>
+            <p:cNvSpPr txBox="1"/>
+            <p:nvPr/>
+          </p:nvSpPr>
+          <p:spPr>
+            <a:xfrm>
+              <a:off x="3853137" y="4595300"/>
+              <a:ext cx="2166427" cy="738664"/>
+            </a:xfrm>
+            <a:prstGeom prst="rect">
+              <a:avLst/>
+            </a:prstGeom>
+            <a:noFill/>
+          </p:spPr>
+          <p:txBody>
+            <a:bodyPr wrap="none" rtlCol="0">
+              <a:spAutoFit/>
+            </a:bodyPr>
+            <a:lstStyle/>
+            <a:p>
+              <a:pPr algn="ctr"/>
+              <a:r>
+                <a:rPr lang="en-NL" b="1" i="1" dirty="0">
+                  <a:latin typeface="Avenir Black Oblique" panose="02000503020000020003" pitchFamily="2" charset="0"/>
+                </a:rPr>
+                <a:t>SOFTWARE</a:t>
+              </a:r>
+            </a:p>
+            <a:p>
+              <a:pPr algn="ctr"/>
+              <a:r>
+                <a:rPr lang="en-GB" sz="1200" dirty="0">
+                  <a:latin typeface="Avenir Medium" panose="02000503020000020003" pitchFamily="2" charset="0"/>
+                </a:rPr>
+                <a:t>Lorem ipsum dolor sit </a:t>
+              </a:r>
+              <a:r>
+                <a:rPr lang="en-GB" sz="1200" dirty="0" err="1">
+                  <a:latin typeface="Avenir Medium" panose="02000503020000020003" pitchFamily="2" charset="0"/>
+                </a:rPr>
+                <a:t>amet</a:t>
+              </a:r>
+              <a:endParaRPr lang="en-GB" sz="1200" dirty="0">
+                <a:latin typeface="Avenir Medium" panose="02000503020000020003" pitchFamily="2" charset="0"/>
+              </a:endParaRPr>
+            </a:p>
+            <a:p>
+              <a:pPr algn="ctr"/>
+              <a:r>
+                <a:rPr lang="en-GB" sz="1200" dirty="0">
+                  <a:latin typeface="Avenir Medium" panose="02000503020000020003" pitchFamily="2" charset="0"/>
+                </a:rPr>
+                <a:t>Nunc viverra </a:t>
+              </a:r>
+              <a:r>
+                <a:rPr lang="en-GB" sz="1200" dirty="0" err="1">
+                  <a:latin typeface="Avenir Medium" panose="02000503020000020003" pitchFamily="2" charset="0"/>
+                </a:rPr>
+                <a:t>imperdiet</a:t>
+              </a:r>
+              <a:r>
+                <a:rPr lang="en-GB" sz="1200" dirty="0">
+                  <a:latin typeface="Avenir Medium" panose="02000503020000020003" pitchFamily="2" charset="0"/>
+                </a:rPr>
+                <a:t> </a:t>
+              </a:r>
+              <a:r>
+                <a:rPr lang="en-GB" sz="1200" dirty="0" err="1">
+                  <a:latin typeface="Avenir Medium" panose="02000503020000020003" pitchFamily="2" charset="0"/>
+                </a:rPr>
+                <a:t>enim</a:t>
+              </a:r>
+              <a:endParaRPr lang="en-NL" sz="1200" dirty="0">
+                <a:latin typeface="Avenir Medium" panose="02000503020000020003" pitchFamily="2" charset="0"/>
+              </a:endParaRPr>
+            </a:p>
+          </p:txBody>
+        </p:sp>
+      </p:grpSp>
+      <p:grpSp>
+        <p:nvGrpSpPr>
+          <p:cNvPr id="35" name="Group 34">
+            <a:extLst>
+              <a:ext uri="{FF2B5EF4-FFF2-40B4-BE49-F238E27FC236}">
+                <a16:creationId xmlns:a16="http://schemas.microsoft.com/office/drawing/2014/main" id="{57AC56BC-FC54-589B-B09A-69E61569942E}"/>
+              </a:ext>
+            </a:extLst>
+          </p:cNvPr>
+          <p:cNvGrpSpPr/>
+          <p:nvPr/>
+        </p:nvGrpSpPr>
+        <p:grpSpPr>
+          <a:xfrm>
+            <a:off x="6106480" y="4225969"/>
+            <a:ext cx="2166427" cy="1107995"/>
+            <a:chOff x="6106480" y="4225969"/>
+            <a:chExt cx="2166427" cy="1107995"/>
+          </a:xfrm>
+        </p:grpSpPr>
+        <p:sp>
+          <p:nvSpPr>
+            <p:cNvPr id="25" name="TextBox 24">
+              <a:extLst>
+                <a:ext uri="{FF2B5EF4-FFF2-40B4-BE49-F238E27FC236}">
+                  <a16:creationId xmlns:a16="http://schemas.microsoft.com/office/drawing/2014/main" id="{B67F362A-57B5-66B3-5344-49FBBF5A059C}"/>
+                </a:ext>
+              </a:extLst>
+            </p:cNvPr>
+            <p:cNvSpPr txBox="1"/>
+            <p:nvPr/>
+          </p:nvSpPr>
+          <p:spPr>
+            <a:xfrm>
+              <a:off x="6897787" y="4225969"/>
+              <a:ext cx="583814" cy="369332"/>
+            </a:xfrm>
+            <a:prstGeom prst="rect">
+              <a:avLst/>
+            </a:prstGeom>
+            <a:noFill/>
+          </p:spPr>
+          <p:txBody>
+            <a:bodyPr wrap="none" rtlCol="0">
+              <a:spAutoFit/>
+            </a:bodyPr>
+            <a:lstStyle/>
+            <a:p>
+              <a:r>
+                <a:rPr lang="en-NL" dirty="0">
+                  <a:solidFill>
+                    <a:srgbClr val="F9E4D4"/>
+                  </a:solidFill>
+                </a:rPr>
+                <a:t>70%</a:t>
+              </a:r>
+            </a:p>
+          </p:txBody>
+        </p:sp>
+        <p:sp>
+          <p:nvSpPr>
+            <p:cNvPr id="29" name="Hardware">
+              <a:extLst>
+                <a:ext uri="{FF2B5EF4-FFF2-40B4-BE49-F238E27FC236}">
+                  <a16:creationId xmlns:a16="http://schemas.microsoft.com/office/drawing/2014/main" id="{39296DE3-5249-1B3B-3CD1-2B06A84FED7E}"/>
+                </a:ext>
+              </a:extLst>
+            </p:cNvPr>
+            <p:cNvSpPr txBox="1"/>
+            <p:nvPr/>
+          </p:nvSpPr>
+          <p:spPr>
+            <a:xfrm>
+              <a:off x="6106480" y="4595300"/>
+              <a:ext cx="2166427" cy="738664"/>
+            </a:xfrm>
+            <a:prstGeom prst="rect">
+              <a:avLst/>
+            </a:prstGeom>
+            <a:noFill/>
+          </p:spPr>
+          <p:txBody>
+            <a:bodyPr wrap="none" rtlCol="0">
+              <a:spAutoFit/>
+            </a:bodyPr>
+            <a:lstStyle/>
+            <a:p>
+              <a:pPr algn="ctr"/>
+              <a:r>
+                <a:rPr lang="en-NL" b="1" i="1" dirty="0">
+                  <a:latin typeface="Avenir Black Oblique" panose="02000503020000020003" pitchFamily="2" charset="0"/>
+                </a:rPr>
+                <a:t>HARDWARE</a:t>
+              </a:r>
+            </a:p>
+            <a:p>
+              <a:pPr algn="ctr"/>
+              <a:r>
+                <a:rPr lang="en-GB" sz="1200" dirty="0">
+                  <a:latin typeface="Avenir Medium" panose="02000503020000020003" pitchFamily="2" charset="0"/>
+                </a:rPr>
+                <a:t>Lorem ipsum dolor sit </a:t>
+              </a:r>
+              <a:r>
+                <a:rPr lang="en-GB" sz="1200" dirty="0" err="1">
+                  <a:latin typeface="Avenir Medium" panose="02000503020000020003" pitchFamily="2" charset="0"/>
+                </a:rPr>
+                <a:t>amet</a:t>
+              </a:r>
+              <a:endParaRPr lang="en-GB" sz="1200" dirty="0">
+                <a:latin typeface="Avenir Medium" panose="02000503020000020003" pitchFamily="2" charset="0"/>
+              </a:endParaRPr>
+            </a:p>
+            <a:p>
+              <a:pPr algn="ctr"/>
+              <a:r>
+                <a:rPr lang="en-GB" sz="1200" dirty="0">
+                  <a:latin typeface="Avenir Medium" panose="02000503020000020003" pitchFamily="2" charset="0"/>
+                </a:rPr>
+                <a:t>Nunc viverra </a:t>
+              </a:r>
+              <a:r>
+                <a:rPr lang="en-GB" sz="1200" dirty="0" err="1">
+                  <a:latin typeface="Avenir Medium" panose="02000503020000020003" pitchFamily="2" charset="0"/>
+                </a:rPr>
+                <a:t>imperdiet</a:t>
+              </a:r>
+              <a:r>
+                <a:rPr lang="en-GB" sz="1200" dirty="0">
+                  <a:latin typeface="Avenir Medium" panose="02000503020000020003" pitchFamily="2" charset="0"/>
+                </a:rPr>
+                <a:t> </a:t>
+              </a:r>
+              <a:r>
+                <a:rPr lang="en-GB" sz="1200" dirty="0" err="1">
+                  <a:latin typeface="Avenir Medium" panose="02000503020000020003" pitchFamily="2" charset="0"/>
+                </a:rPr>
+                <a:t>enim</a:t>
+              </a:r>
+              <a:endParaRPr lang="en-NL" sz="1200" dirty="0">
+                <a:latin typeface="Avenir Medium" panose="02000503020000020003" pitchFamily="2" charset="0"/>
+              </a:endParaRPr>
+            </a:p>
+          </p:txBody>
+        </p:sp>
+      </p:grpSp>
+      <p:grpSp>
+        <p:nvGrpSpPr>
+          <p:cNvPr id="36" name="Group 35">
+            <a:extLst>
+              <a:ext uri="{FF2B5EF4-FFF2-40B4-BE49-F238E27FC236}">
+                <a16:creationId xmlns:a16="http://schemas.microsoft.com/office/drawing/2014/main" id="{4369990F-D798-0DE6-CA7B-10BBD8E6AFE0}"/>
+              </a:ext>
+            </a:extLst>
+          </p:cNvPr>
+          <p:cNvGrpSpPr/>
+          <p:nvPr/>
+        </p:nvGrpSpPr>
+        <p:grpSpPr>
+          <a:xfrm>
+            <a:off x="8363092" y="4225969"/>
+            <a:ext cx="2166427" cy="1107995"/>
+            <a:chOff x="8363092" y="4225969"/>
+            <a:chExt cx="2166427" cy="1107995"/>
+          </a:xfrm>
+        </p:grpSpPr>
+        <p:sp>
+          <p:nvSpPr>
+            <p:cNvPr id="26" name="TextBox 25">
+              <a:extLst>
+                <a:ext uri="{FF2B5EF4-FFF2-40B4-BE49-F238E27FC236}">
+                  <a16:creationId xmlns:a16="http://schemas.microsoft.com/office/drawing/2014/main" id="{04AE0F42-529B-A41A-F6B8-57754DEB8FA2}"/>
+                </a:ext>
+              </a:extLst>
+            </p:cNvPr>
+            <p:cNvSpPr txBox="1"/>
+            <p:nvPr/>
+          </p:nvSpPr>
+          <p:spPr>
+            <a:xfrm>
+              <a:off x="9151131" y="4225969"/>
+              <a:ext cx="583814" cy="369332"/>
+            </a:xfrm>
+            <a:prstGeom prst="rect">
+              <a:avLst/>
+            </a:prstGeom>
+            <a:noFill/>
+          </p:spPr>
+          <p:txBody>
+            <a:bodyPr wrap="none" rtlCol="0">
+              <a:spAutoFit/>
+            </a:bodyPr>
+            <a:lstStyle/>
+            <a:p>
+              <a:r>
+                <a:rPr lang="en-NL" dirty="0">
+                  <a:solidFill>
+                    <a:srgbClr val="470D21"/>
+                  </a:solidFill>
+                </a:rPr>
+                <a:t>90%</a:t>
+              </a:r>
+            </a:p>
+          </p:txBody>
+        </p:sp>
+        <p:sp>
+          <p:nvSpPr>
+            <p:cNvPr id="30" name="Security">
+              <a:extLst>
+                <a:ext uri="{FF2B5EF4-FFF2-40B4-BE49-F238E27FC236}">
+                  <a16:creationId xmlns:a16="http://schemas.microsoft.com/office/drawing/2014/main" id="{1AF81867-9D35-89F8-18A9-E13C850C9827}"/>
+                </a:ext>
+              </a:extLst>
+            </p:cNvPr>
+            <p:cNvSpPr txBox="1"/>
+            <p:nvPr/>
+          </p:nvSpPr>
+          <p:spPr>
+            <a:xfrm>
+              <a:off x="8363092" y="4595300"/>
+              <a:ext cx="2166427" cy="738664"/>
+            </a:xfrm>
+            <a:prstGeom prst="rect">
+              <a:avLst/>
+            </a:prstGeom>
+            <a:noFill/>
+          </p:spPr>
+          <p:txBody>
+            <a:bodyPr wrap="none" rtlCol="0">
+              <a:spAutoFit/>
+            </a:bodyPr>
+            <a:lstStyle/>
+            <a:p>
+              <a:pPr algn="ctr"/>
+              <a:r>
+                <a:rPr lang="en-NL" b="1" i="1" dirty="0">
+                  <a:latin typeface="Avenir Black Oblique" panose="02000503020000020003" pitchFamily="2" charset="0"/>
+                </a:rPr>
+                <a:t>SECURITY</a:t>
+              </a:r>
+            </a:p>
+            <a:p>
+              <a:pPr algn="ctr"/>
+              <a:r>
+                <a:rPr lang="en-GB" sz="1200" dirty="0">
+                  <a:latin typeface="Avenir Medium" panose="02000503020000020003" pitchFamily="2" charset="0"/>
+                </a:rPr>
+                <a:t>Lorem ipsum dolor sit </a:t>
+              </a:r>
+              <a:r>
+                <a:rPr lang="en-GB" sz="1200" dirty="0" err="1">
+                  <a:latin typeface="Avenir Medium" panose="02000503020000020003" pitchFamily="2" charset="0"/>
+                </a:rPr>
+                <a:t>amet</a:t>
+              </a:r>
+              <a:endParaRPr lang="en-GB" sz="1200" dirty="0">
+                <a:latin typeface="Avenir Medium" panose="02000503020000020003" pitchFamily="2" charset="0"/>
+              </a:endParaRPr>
+            </a:p>
+            <a:p>
+              <a:pPr algn="ctr"/>
+              <a:r>
+                <a:rPr lang="en-GB" sz="1200" dirty="0">
+                  <a:latin typeface="Avenir Medium" panose="02000503020000020003" pitchFamily="2" charset="0"/>
+                </a:rPr>
+                <a:t>Nunc viverra </a:t>
+              </a:r>
+              <a:r>
+                <a:rPr lang="en-GB" sz="1200" dirty="0" err="1">
+                  <a:latin typeface="Avenir Medium" panose="02000503020000020003" pitchFamily="2" charset="0"/>
+                </a:rPr>
+                <a:t>imperdiet</a:t>
+              </a:r>
+              <a:r>
+                <a:rPr lang="en-GB" sz="1200" dirty="0">
+                  <a:latin typeface="Avenir Medium" panose="02000503020000020003" pitchFamily="2" charset="0"/>
+                </a:rPr>
+                <a:t> </a:t>
+              </a:r>
+              <a:r>
+                <a:rPr lang="en-GB" sz="1200" dirty="0" err="1">
+                  <a:latin typeface="Avenir Medium" panose="02000503020000020003" pitchFamily="2" charset="0"/>
+                </a:rPr>
+                <a:t>enim</a:t>
+              </a:r>
+              <a:endParaRPr lang="en-NL" sz="1200" dirty="0">
+                <a:latin typeface="Avenir Medium" panose="02000503020000020003" pitchFamily="2" charset="0"/>
+              </a:endParaRPr>
+            </a:p>
+          </p:txBody>
+        </p:sp>
+      </p:grpSp>
+      <p:sp>
+        <p:nvSpPr>
+          <p:cNvPr id="32" name="Software">
+            <a:extLst>
+              <a:ext uri="{FF2B5EF4-FFF2-40B4-BE49-F238E27FC236}">
+                <a16:creationId xmlns:a16="http://schemas.microsoft.com/office/drawing/2014/main" id="{293A6673-51E3-E183-53DA-E166B9B08B25}"/>
               </a:ext>
             </a:extLst>
           </p:cNvPr>
@@ -4376,8 +4960,8 @@
         </p:nvSpPr>
         <p:spPr>
           <a:xfrm>
-            <a:off x="2394856" y="4191000"/>
-            <a:ext cx="583814" cy="369332"/>
+            <a:off x="1259195" y="476507"/>
+            <a:ext cx="9673610" cy="1754326"/>
           </a:xfrm>
           <a:prstGeom prst="rect">
             <a:avLst/>
@@ -4390,475 +4974,22 @@
           </a:bodyPr>
           <a:lstStyle/>
           <a:p>
-            <a:r>
-              <a:rPr lang="en-NL" dirty="0">
-                <a:solidFill>
-                  <a:srgbClr val="D67D3E"/>
-                </a:solidFill>
-              </a:rPr>
-              <a:t>30%</a:t>
-            </a:r>
-          </a:p>
-        </p:txBody>
-      </p:sp>
-      <p:sp>
-        <p:nvSpPr>
-          <p:cNvPr id="24" name="TextBox 23">
-            <a:extLst>
-              <a:ext uri="{FF2B5EF4-FFF2-40B4-BE49-F238E27FC236}">
-                <a16:creationId xmlns:a16="http://schemas.microsoft.com/office/drawing/2014/main" id="{65236C97-4095-384F-E52F-1C08C11EEF03}"/>
-              </a:ext>
-            </a:extLst>
-          </p:cNvPr>
-          <p:cNvSpPr txBox="1"/>
-          <p:nvPr/>
-        </p:nvSpPr>
-        <p:spPr>
-          <a:xfrm>
-            <a:off x="4644444" y="4225969"/>
-            <a:ext cx="583814" cy="369332"/>
-          </a:xfrm>
-          <a:prstGeom prst="rect">
-            <a:avLst/>
-          </a:prstGeom>
-          <a:noFill/>
-        </p:spPr>
-        <p:txBody>
-          <a:bodyPr wrap="none" rtlCol="0">
-            <a:spAutoFit/>
-          </a:bodyPr>
-          <a:lstStyle/>
-          <a:p>
-            <a:r>
-              <a:rPr lang="en-NL" dirty="0">
-                <a:solidFill>
-                  <a:srgbClr val="9F0F48"/>
-                </a:solidFill>
-              </a:rPr>
-              <a:t>45%</a:t>
-            </a:r>
-          </a:p>
-        </p:txBody>
-      </p:sp>
-      <p:sp>
-        <p:nvSpPr>
-          <p:cNvPr id="25" name="TextBox 24">
-            <a:extLst>
-              <a:ext uri="{FF2B5EF4-FFF2-40B4-BE49-F238E27FC236}">
-                <a16:creationId xmlns:a16="http://schemas.microsoft.com/office/drawing/2014/main" id="{B67F362A-57B5-66B3-5344-49FBBF5A059C}"/>
-              </a:ext>
-            </a:extLst>
-          </p:cNvPr>
-          <p:cNvSpPr txBox="1"/>
-          <p:nvPr/>
-        </p:nvSpPr>
-        <p:spPr>
-          <a:xfrm>
-            <a:off x="6897787" y="4225969"/>
-            <a:ext cx="583814" cy="369332"/>
-          </a:xfrm>
-          <a:prstGeom prst="rect">
-            <a:avLst/>
-          </a:prstGeom>
-          <a:noFill/>
-        </p:spPr>
-        <p:txBody>
-          <a:bodyPr wrap="none" rtlCol="0">
-            <a:spAutoFit/>
-          </a:bodyPr>
-          <a:lstStyle/>
-          <a:p>
-            <a:r>
-              <a:rPr lang="en-NL" dirty="0">
-                <a:solidFill>
-                  <a:srgbClr val="F9E4D4"/>
-                </a:solidFill>
-              </a:rPr>
-              <a:t>70%</a:t>
-            </a:r>
-          </a:p>
-        </p:txBody>
-      </p:sp>
-      <p:sp>
-        <p:nvSpPr>
-          <p:cNvPr id="26" name="TextBox 25">
-            <a:extLst>
-              <a:ext uri="{FF2B5EF4-FFF2-40B4-BE49-F238E27FC236}">
-                <a16:creationId xmlns:a16="http://schemas.microsoft.com/office/drawing/2014/main" id="{04AE0F42-529B-A41A-F6B8-57754DEB8FA2}"/>
-              </a:ext>
-            </a:extLst>
-          </p:cNvPr>
-          <p:cNvSpPr txBox="1"/>
-          <p:nvPr/>
-        </p:nvSpPr>
-        <p:spPr>
-          <a:xfrm>
-            <a:off x="9151131" y="4225969"/>
-            <a:ext cx="583814" cy="369332"/>
-          </a:xfrm>
-          <a:prstGeom prst="rect">
-            <a:avLst/>
-          </a:prstGeom>
-          <a:noFill/>
-        </p:spPr>
-        <p:txBody>
-          <a:bodyPr wrap="none" rtlCol="0">
-            <a:spAutoFit/>
-          </a:bodyPr>
-          <a:lstStyle/>
-          <a:p>
-            <a:r>
-              <a:rPr lang="en-NL" dirty="0">
-                <a:solidFill>
-                  <a:srgbClr val="470D21"/>
-                </a:solidFill>
-              </a:rPr>
-              <a:t>90%</a:t>
-            </a:r>
-          </a:p>
-        </p:txBody>
-      </p:sp>
-      <p:sp>
-        <p:nvSpPr>
-          <p:cNvPr id="27" name="Design">
-            <a:extLst>
-              <a:ext uri="{FF2B5EF4-FFF2-40B4-BE49-F238E27FC236}">
-                <a16:creationId xmlns:a16="http://schemas.microsoft.com/office/drawing/2014/main" id="{F00ADE21-6197-96DC-F6D2-B88581AF89A8}"/>
-              </a:ext>
-            </a:extLst>
-          </p:cNvPr>
-          <p:cNvSpPr txBox="1"/>
-          <p:nvPr/>
-        </p:nvSpPr>
-        <p:spPr>
-          <a:xfrm>
-            <a:off x="1599794" y="4595300"/>
-            <a:ext cx="2166427" cy="738664"/>
-          </a:xfrm>
-          <a:prstGeom prst="rect">
-            <a:avLst/>
-          </a:prstGeom>
-          <a:noFill/>
-        </p:spPr>
-        <p:txBody>
-          <a:bodyPr wrap="none" rtlCol="0">
-            <a:spAutoFit/>
-          </a:bodyPr>
-          <a:lstStyle/>
-          <a:p>
             <a:pPr algn="ctr"/>
             <a:r>
-              <a:rPr lang="en-NL" b="1" i="1" dirty="0">
+              <a:rPr lang="en-NL" sz="5400" b="1" i="1" dirty="0">
                 <a:latin typeface="Avenir Black Oblique" panose="02000503020000020003" pitchFamily="2" charset="0"/>
               </a:rPr>
-              <a:t>DESIGN</a:t>
+              <a:t>PERCENTAGES OF SERVICE </a:t>
             </a:r>
           </a:p>
           <a:p>
             <a:pPr algn="ctr"/>
             <a:r>
-              <a:rPr lang="en-GB" sz="1200" dirty="0">
-                <a:latin typeface="Avenir Medium" panose="02000503020000020003" pitchFamily="2" charset="0"/>
-              </a:rPr>
-              <a:t>Lorem ipsum dolor sit </a:t>
-            </a:r>
-            <a:r>
-              <a:rPr lang="en-GB" sz="1200" dirty="0" err="1">
-                <a:latin typeface="Avenir Medium" panose="02000503020000020003" pitchFamily="2" charset="0"/>
-              </a:rPr>
-              <a:t>amet</a:t>
-            </a:r>
-            <a:endParaRPr lang="en-GB" sz="1200" dirty="0">
-              <a:latin typeface="Avenir Medium" panose="02000503020000020003" pitchFamily="2" charset="0"/>
-            </a:endParaRPr>
-          </a:p>
-          <a:p>
-            <a:pPr algn="ctr"/>
-            <a:r>
-              <a:rPr lang="en-GB" sz="1200" dirty="0">
-                <a:latin typeface="Avenir Medium" panose="02000503020000020003" pitchFamily="2" charset="0"/>
-              </a:rPr>
-              <a:t>Nunc viverra </a:t>
-            </a:r>
-            <a:r>
-              <a:rPr lang="en-GB" sz="1200" dirty="0" err="1">
-                <a:latin typeface="Avenir Medium" panose="02000503020000020003" pitchFamily="2" charset="0"/>
-              </a:rPr>
-              <a:t>imperdiet</a:t>
-            </a:r>
-            <a:r>
-              <a:rPr lang="en-GB" sz="1200" dirty="0">
-                <a:latin typeface="Avenir Medium" panose="02000503020000020003" pitchFamily="2" charset="0"/>
-              </a:rPr>
-              <a:t> </a:t>
-            </a:r>
-            <a:r>
-              <a:rPr lang="en-GB" sz="1200" dirty="0" err="1">
-                <a:latin typeface="Avenir Medium" panose="02000503020000020003" pitchFamily="2" charset="0"/>
-              </a:rPr>
-              <a:t>enim</a:t>
-            </a:r>
-            <a:endParaRPr lang="en-NL" sz="1200" dirty="0">
-              <a:latin typeface="Avenir Medium" panose="02000503020000020003" pitchFamily="2" charset="0"/>
-            </a:endParaRPr>
-          </a:p>
-        </p:txBody>
-      </p:sp>
-      <p:sp>
-        <p:nvSpPr>
-          <p:cNvPr id="28" name="Software">
-            <a:extLst>
-              <a:ext uri="{FF2B5EF4-FFF2-40B4-BE49-F238E27FC236}">
-                <a16:creationId xmlns:a16="http://schemas.microsoft.com/office/drawing/2014/main" id="{C1C4479E-17C9-1584-EC97-D0C72249FA79}"/>
-              </a:ext>
-            </a:extLst>
-          </p:cNvPr>
-          <p:cNvSpPr txBox="1"/>
-          <p:nvPr/>
-        </p:nvSpPr>
-        <p:spPr>
-          <a:xfrm>
-            <a:off x="3853137" y="4595300"/>
-            <a:ext cx="2166427" cy="738664"/>
-          </a:xfrm>
-          <a:prstGeom prst="rect">
-            <a:avLst/>
-          </a:prstGeom>
-          <a:noFill/>
-        </p:spPr>
-        <p:txBody>
-          <a:bodyPr wrap="none" rtlCol="0">
-            <a:spAutoFit/>
-          </a:bodyPr>
-          <a:lstStyle/>
-          <a:p>
-            <a:pPr algn="ctr"/>
-            <a:r>
-              <a:rPr lang="en-NL" b="1" i="1" dirty="0">
+              <a:rPr lang="en-NL" sz="5400" b="1" i="1" dirty="0">
                 <a:latin typeface="Avenir Black Oblique" panose="02000503020000020003" pitchFamily="2" charset="0"/>
               </a:rPr>
-              <a:t>SOFTWARE</a:t>
-            </a:r>
-          </a:p>
-          <a:p>
-            <a:pPr algn="ctr"/>
-            <a:r>
-              <a:rPr lang="en-GB" sz="1200" dirty="0">
-                <a:latin typeface="Avenir Medium" panose="02000503020000020003" pitchFamily="2" charset="0"/>
-              </a:rPr>
-              <a:t>Lorem ipsum dolor sit </a:t>
-            </a:r>
-            <a:r>
-              <a:rPr lang="en-GB" sz="1200" dirty="0" err="1">
-                <a:latin typeface="Avenir Medium" panose="02000503020000020003" pitchFamily="2" charset="0"/>
-              </a:rPr>
-              <a:t>amet</a:t>
-            </a:r>
-            <a:endParaRPr lang="en-GB" sz="1200" dirty="0">
-              <a:latin typeface="Avenir Medium" panose="02000503020000020003" pitchFamily="2" charset="0"/>
-            </a:endParaRPr>
-          </a:p>
-          <a:p>
-            <a:pPr algn="ctr"/>
-            <a:r>
-              <a:rPr lang="en-GB" sz="1200" dirty="0">
-                <a:latin typeface="Avenir Medium" panose="02000503020000020003" pitchFamily="2" charset="0"/>
-              </a:rPr>
-              <a:t>Nunc viverra </a:t>
-            </a:r>
-            <a:r>
-              <a:rPr lang="en-GB" sz="1200" dirty="0" err="1">
-                <a:latin typeface="Avenir Medium" panose="02000503020000020003" pitchFamily="2" charset="0"/>
-              </a:rPr>
-              <a:t>imperdiet</a:t>
-            </a:r>
-            <a:r>
-              <a:rPr lang="en-GB" sz="1200" dirty="0">
-                <a:latin typeface="Avenir Medium" panose="02000503020000020003" pitchFamily="2" charset="0"/>
-              </a:rPr>
-              <a:t> </a:t>
-            </a:r>
-            <a:r>
-              <a:rPr lang="en-GB" sz="1200" dirty="0" err="1">
-                <a:latin typeface="Avenir Medium" panose="02000503020000020003" pitchFamily="2" charset="0"/>
-              </a:rPr>
-              <a:t>enim</a:t>
-            </a:r>
-            <a:endParaRPr lang="en-NL" sz="1200" dirty="0">
-              <a:latin typeface="Avenir Medium" panose="02000503020000020003" pitchFamily="2" charset="0"/>
-            </a:endParaRPr>
-          </a:p>
-        </p:txBody>
-      </p:sp>
-      <p:sp>
-        <p:nvSpPr>
-          <p:cNvPr id="29" name="Hardware">
-            <a:extLst>
-              <a:ext uri="{FF2B5EF4-FFF2-40B4-BE49-F238E27FC236}">
-                <a16:creationId xmlns:a16="http://schemas.microsoft.com/office/drawing/2014/main" id="{39296DE3-5249-1B3B-3CD1-2B06A84FED7E}"/>
-              </a:ext>
-            </a:extLst>
-          </p:cNvPr>
-          <p:cNvSpPr txBox="1"/>
-          <p:nvPr/>
-        </p:nvSpPr>
-        <p:spPr>
-          <a:xfrm>
-            <a:off x="6106480" y="4595300"/>
-            <a:ext cx="2166427" cy="738664"/>
-          </a:xfrm>
-          <a:prstGeom prst="rect">
-            <a:avLst/>
-          </a:prstGeom>
-          <a:noFill/>
-        </p:spPr>
-        <p:txBody>
-          <a:bodyPr wrap="none" rtlCol="0">
-            <a:spAutoFit/>
-          </a:bodyPr>
-          <a:lstStyle/>
-          <a:p>
-            <a:pPr algn="ctr"/>
-            <a:r>
-              <a:rPr lang="en-NL" b="1" i="1" dirty="0">
-                <a:latin typeface="Avenir Black Oblique" panose="02000503020000020003" pitchFamily="2" charset="0"/>
-              </a:rPr>
-              <a:t>HARDWARE</a:t>
-            </a:r>
-          </a:p>
-          <a:p>
-            <a:pPr algn="ctr"/>
-            <a:r>
-              <a:rPr lang="en-GB" sz="1200" dirty="0">
-                <a:latin typeface="Avenir Medium" panose="02000503020000020003" pitchFamily="2" charset="0"/>
-              </a:rPr>
-              <a:t>Lorem ipsum dolor sit </a:t>
-            </a:r>
-            <a:r>
-              <a:rPr lang="en-GB" sz="1200" dirty="0" err="1">
-                <a:latin typeface="Avenir Medium" panose="02000503020000020003" pitchFamily="2" charset="0"/>
-              </a:rPr>
-              <a:t>amet</a:t>
-            </a:r>
-            <a:endParaRPr lang="en-GB" sz="1200" dirty="0">
-              <a:latin typeface="Avenir Medium" panose="02000503020000020003" pitchFamily="2" charset="0"/>
-            </a:endParaRPr>
-          </a:p>
-          <a:p>
-            <a:pPr algn="ctr"/>
-            <a:r>
-              <a:rPr lang="en-GB" sz="1200" dirty="0">
-                <a:latin typeface="Avenir Medium" panose="02000503020000020003" pitchFamily="2" charset="0"/>
-              </a:rPr>
-              <a:t>Nunc viverra </a:t>
-            </a:r>
-            <a:r>
-              <a:rPr lang="en-GB" sz="1200" dirty="0" err="1">
-                <a:latin typeface="Avenir Medium" panose="02000503020000020003" pitchFamily="2" charset="0"/>
-              </a:rPr>
-              <a:t>imperdiet</a:t>
-            </a:r>
-            <a:r>
-              <a:rPr lang="en-GB" sz="1200" dirty="0">
-                <a:latin typeface="Avenir Medium" panose="02000503020000020003" pitchFamily="2" charset="0"/>
-              </a:rPr>
-              <a:t> </a:t>
-            </a:r>
-            <a:r>
-              <a:rPr lang="en-GB" sz="1200" dirty="0" err="1">
-                <a:latin typeface="Avenir Medium" panose="02000503020000020003" pitchFamily="2" charset="0"/>
-              </a:rPr>
-              <a:t>enim</a:t>
-            </a:r>
-            <a:endParaRPr lang="en-NL" sz="1200" dirty="0">
-              <a:latin typeface="Avenir Medium" panose="02000503020000020003" pitchFamily="2" charset="0"/>
-            </a:endParaRPr>
-          </a:p>
-        </p:txBody>
-      </p:sp>
-      <p:sp>
-        <p:nvSpPr>
-          <p:cNvPr id="30" name="Security">
-            <a:extLst>
-              <a:ext uri="{FF2B5EF4-FFF2-40B4-BE49-F238E27FC236}">
-                <a16:creationId xmlns:a16="http://schemas.microsoft.com/office/drawing/2014/main" id="{1AF81867-9D35-89F8-18A9-E13C850C9827}"/>
-              </a:ext>
-            </a:extLst>
-          </p:cNvPr>
-          <p:cNvSpPr txBox="1"/>
-          <p:nvPr/>
-        </p:nvSpPr>
-        <p:spPr>
-          <a:xfrm>
-            <a:off x="8363092" y="4595300"/>
-            <a:ext cx="2166427" cy="738664"/>
-          </a:xfrm>
-          <a:prstGeom prst="rect">
-            <a:avLst/>
-          </a:prstGeom>
-          <a:noFill/>
-        </p:spPr>
-        <p:txBody>
-          <a:bodyPr wrap="none" rtlCol="0">
-            <a:spAutoFit/>
-          </a:bodyPr>
-          <a:lstStyle/>
-          <a:p>
-            <a:pPr algn="ctr"/>
-            <a:r>
-              <a:rPr lang="en-NL" b="1" i="1" dirty="0">
-                <a:latin typeface="Avenir Black Oblique" panose="02000503020000020003" pitchFamily="2" charset="0"/>
-              </a:rPr>
-              <a:t>SECURITY</a:t>
-            </a:r>
-          </a:p>
-          <a:p>
-            <a:pPr algn="ctr"/>
-            <a:r>
-              <a:rPr lang="en-GB" sz="1200" dirty="0">
-                <a:latin typeface="Avenir Medium" panose="02000503020000020003" pitchFamily="2" charset="0"/>
-              </a:rPr>
-              <a:t>Lorem ipsum dolor sit </a:t>
-            </a:r>
-            <a:r>
-              <a:rPr lang="en-GB" sz="1200" dirty="0" err="1">
-                <a:latin typeface="Avenir Medium" panose="02000503020000020003" pitchFamily="2" charset="0"/>
-              </a:rPr>
-              <a:t>amet</a:t>
-            </a:r>
-            <a:endParaRPr lang="en-GB" sz="1200" dirty="0">
-              <a:latin typeface="Avenir Medium" panose="02000503020000020003" pitchFamily="2" charset="0"/>
-            </a:endParaRPr>
-          </a:p>
-          <a:p>
-            <a:pPr algn="ctr"/>
-            <a:r>
-              <a:rPr lang="en-GB" sz="1200" dirty="0">
-                <a:latin typeface="Avenir Medium" panose="02000503020000020003" pitchFamily="2" charset="0"/>
-              </a:rPr>
-              <a:t>Nunc viverra </a:t>
-            </a:r>
-            <a:r>
-              <a:rPr lang="en-GB" sz="1200" dirty="0" err="1">
-                <a:latin typeface="Avenir Medium" panose="02000503020000020003" pitchFamily="2" charset="0"/>
-              </a:rPr>
-              <a:t>imperdiet</a:t>
-            </a:r>
-            <a:r>
-              <a:rPr lang="en-GB" sz="1200" dirty="0">
-                <a:latin typeface="Avenir Medium" panose="02000503020000020003" pitchFamily="2" charset="0"/>
-              </a:rPr>
-              <a:t> </a:t>
-            </a:r>
-            <a:r>
-              <a:rPr lang="en-GB" sz="1200" dirty="0" err="1">
-                <a:latin typeface="Avenir Medium" panose="02000503020000020003" pitchFamily="2" charset="0"/>
-              </a:rPr>
-              <a:t>enim</a:t>
-            </a:r>
-            <a:endParaRPr lang="en-NL" sz="1200" dirty="0">
-              <a:latin typeface="Avenir Medium" panose="02000503020000020003" pitchFamily="2" charset="0"/>
-            </a:endParaRPr>
+              <a:t>ON IT INDUSTRY</a:t>
+            </a:r>
           </a:p>
         </p:txBody>
       </p:sp>
@@ -4896,7 +5027,7 @@
                             </p:stCondLst>
                             <p:childTnLst>
                               <p:par>
-                                <p:cTn id="5" presetID="53" presetClass="entr" presetSubtype="16" fill="hold" grpId="0" nodeType="withEffect">
+                                <p:cTn id="5" presetID="2" presetClass="entr" presetSubtype="1" fill="hold" grpId="0" nodeType="withEffect">
                                   <p:stCondLst>
                                     <p:cond delay="0"/>
                                   </p:stCondLst>
@@ -4909,7 +5040,118 @@
                                           </p:stCondLst>
                                         </p:cTn>
                                         <p:tgtEl>
-                                          <p:spTgt spid="27"/>
+                                          <p:spTgt spid="32"/>
+                                        </p:tgtEl>
+                                        <p:attrNameLst>
+                                          <p:attrName>style.visibility</p:attrName>
+                                        </p:attrNameLst>
+                                      </p:cBhvr>
+                                      <p:to>
+                                        <p:strVal val="visible"/>
+                                      </p:to>
+                                    </p:set>
+                                    <p:anim calcmode="lin" valueType="num">
+                                      <p:cBhvr additive="base">
+                                        <p:cTn id="7" dur="1000" fill="hold"/>
+                                        <p:tgtEl>
+                                          <p:spTgt spid="32"/>
+                                        </p:tgtEl>
+                                        <p:attrNameLst>
+                                          <p:attrName>ppt_x</p:attrName>
+                                        </p:attrNameLst>
+                                      </p:cBhvr>
+                                      <p:tavLst>
+                                        <p:tav tm="0">
+                                          <p:val>
+                                            <p:strVal val="#ppt_x"/>
+                                          </p:val>
+                                        </p:tav>
+                                        <p:tav tm="100000">
+                                          <p:val>
+                                            <p:strVal val="#ppt_x"/>
+                                          </p:val>
+                                        </p:tav>
+                                      </p:tavLst>
+                                    </p:anim>
+                                    <p:anim calcmode="lin" valueType="num">
+                                      <p:cBhvr additive="base">
+                                        <p:cTn id="8" dur="1000" fill="hold"/>
+                                        <p:tgtEl>
+                                          <p:spTgt spid="32"/>
+                                        </p:tgtEl>
+                                        <p:attrNameLst>
+                                          <p:attrName>ppt_y</p:attrName>
+                                        </p:attrNameLst>
+                                      </p:cBhvr>
+                                      <p:tavLst>
+                                        <p:tav tm="0">
+                                          <p:val>
+                                            <p:strVal val="0-#ppt_h/2"/>
+                                          </p:val>
+                                        </p:tav>
+                                        <p:tav tm="100000">
+                                          <p:val>
+                                            <p:strVal val="#ppt_y"/>
+                                          </p:val>
+                                        </p:tav>
+                                      </p:tavLst>
+                                    </p:anim>
+                                  </p:childTnLst>
+                                </p:cTn>
+                              </p:par>
+                            </p:childTnLst>
+                          </p:cTn>
+                        </p:par>
+                        <p:par>
+                          <p:cTn id="9" fill="hold">
+                            <p:stCondLst>
+                              <p:cond delay="1000"/>
+                            </p:stCondLst>
+                            <p:childTnLst>
+                              <p:par>
+                                <p:cTn id="10" presetID="8" presetClass="emph" presetSubtype="0" accel="50000" decel="50000" fill="hold" nodeType="afterEffect">
+                                  <p:stCondLst>
+                                    <p:cond delay="0"/>
+                                  </p:stCondLst>
+                                  <p:childTnLst>
+                                    <p:animRot by="3240000">
+                                      <p:cBhvr>
+                                        <p:cTn id="11" dur="1000" fill="hold"/>
+                                        <p:tgtEl>
+                                          <p:spTgt spid="18"/>
+                                        </p:tgtEl>
+                                        <p:attrNameLst>
+                                          <p:attrName>r</p:attrName>
+                                        </p:attrNameLst>
+                                      </p:cBhvr>
+                                    </p:animRot>
+                                  </p:childTnLst>
+                                </p:cTn>
+                              </p:par>
+                            </p:childTnLst>
+                          </p:cTn>
+                        </p:par>
+                        <p:par>
+                          <p:cTn id="12" fill="hold">
+                            <p:stCondLst>
+                              <p:cond delay="2000"/>
+                            </p:stCondLst>
+                            <p:childTnLst>
+                              <p:par>
+                                <p:cTn id="13" presetID="53" presetClass="entr" presetSubtype="16" fill="hold" nodeType="afterEffect">
+                                  <p:stCondLst>
+                                    <p:cond delay="0"/>
+                                  </p:stCondLst>
+                                  <p:childTnLst>
+                                    <p:set>
+                                      <p:cBhvr>
+                                        <p:cTn id="14" dur="1" fill="hold">
+                                          <p:stCondLst>
+                                            <p:cond delay="0"/>
+                                          </p:stCondLst>
+                                        </p:cTn>
+                                        <p:tgtEl>
+                                          <p:spTgt spid="33"/>
                                         </p:tgtEl>
                                         <p:attrNameLst>
                                           <p:attrName>style.visibility</p:attrName>
@@ -4921,9 +5163,9 @@
                                     </p:set>
                                     <p:anim calcmode="lin" valueType="num">
                                       <p:cBhvr>
-                                        <p:cTn id="7" dur="500" fill="hold"/>
+                                        <p:cTn id="15" dur="500" fill="hold"/>
                                         <p:tgtEl>
-                                          <p:spTgt spid="27"/>
+                                          <p:spTgt spid="33"/>
                                         </p:tgtEl>
                                         <p:attrNameLst>
                                           <p:attrName>ppt_w</p:attrName>
@@ -4944,9 +5186,9 @@
                                     </p:anim>
                                     <p:anim calcmode="lin" valueType="num">
                                       <p:cBhvr>
-                                        <p:cTn id="8" dur="500" fill="hold"/>
+                                        <p:cTn id="16" dur="500" fill="hold"/>
                                         <p:tgtEl>
-                                          <p:spTgt spid="27"/>
+                                          <p:spTgt spid="33"/>
                                         </p:tgtEl>
                                         <p:attrNameLst>
                                           <p:attrName>ppt_h</p:attrName>
@@ -4967,26 +5209,35 @@
                                     </p:anim>
                                     <p:animEffect transition="in" filter="fade">
                                       <p:cBhvr>
-                                        <p:cTn id="9" dur="500"/>
+                                        <p:cTn id="17" dur="500"/>
                                         <p:tgtEl>
-                                          <p:spTgt spid="27"/>
+                                          <p:spTgt spid="33"/>
                                         </p:tgtEl>
                                       </p:cBhvr>
                                     </p:animEffect>
                                   </p:childTnLst>
                                 </p:cTn>
                               </p:par>
+                            </p:childTnLst>
+                          </p:cTn>
+                        </p:par>
+                        <p:par>
+                          <p:cTn id="18" fill="hold">
+                            <p:stCondLst>
+                              <p:cond delay="2500"/>
+                            </p:stCondLst>
+                            <p:childTnLst>
                               <p:par>
-                                <p:cTn id="10" presetID="8" presetClass="emph" presetSubtype="0" fill="hold" nodeType="withEffect">
+                                <p:cTn id="19" presetID="8" presetClass="emph" presetSubtype="0" accel="50000" decel="50000" fill="hold" nodeType="afterEffect">
                                   <p:stCondLst>
                                     <p:cond delay="0"/>
                                   </p:stCondLst>
                                   <p:childTnLst>
-                                    <p:animRot by="3240000">
+                                    <p:animRot by="4860000">
                                       <p:cBhvr>
-                                        <p:cTn id="11" dur="1000" fill="hold"/>
+                                        <p:cTn id="20" dur="1000" fill="hold"/>
                                         <p:tgtEl>
-                                          <p:spTgt spid="18"/>
+                                          <p:spTgt spid="19"/>
                                         </p:tgtEl>
                                         <p:attrNameLst>
                                           <p:attrName>r</p:attrName>
@@ -4996,21 +5247,30 @@
                                   </p:childTnLst>
                                 </p:cTn>
                               </p:par>
+                            </p:childTnLst>
+                          </p:cTn>
+                        </p:par>
+                        <p:par>
+                          <p:cTn id="21" fill="hold">
+                            <p:stCondLst>
+                              <p:cond delay="3500"/>
+                            </p:stCondLst>
+                            <p:childTnLst>
                               <p:par>
-                                <p:cTn id="12" presetID="53" presetClass="entr" presetSubtype="16" fill="hold" grpId="0" nodeType="withEffect">
+                                <p:cTn id="22" presetID="53" presetClass="entr" presetSubtype="16" fill="hold" nodeType="afterEffect">
                                   <p:stCondLst>
                                     <p:cond delay="0"/>
                                   </p:stCondLst>
                                   <p:childTnLst>
                                     <p:set>
                                       <p:cBhvr>
-                                        <p:cTn id="13" dur="1" fill="hold">
+                                        <p:cTn id="23" dur="1" fill="hold">
                                           <p:stCondLst>
                                             <p:cond delay="0"/>
                                           </p:stCondLst>
                                         </p:cTn>
                                         <p:tgtEl>
-                                          <p:spTgt spid="28"/>
+                                          <p:spTgt spid="34"/>
                                         </p:tgtEl>
                                         <p:attrNameLst>
                                           <p:attrName>style.visibility</p:attrName>
@@ -5022,9 +5282,9 @@
                                     </p:set>
                                     <p:anim calcmode="lin" valueType="num">
                                       <p:cBhvr>
-                                        <p:cTn id="14" dur="500" fill="hold"/>
+                                        <p:cTn id="24" dur="500" fill="hold"/>
                                         <p:tgtEl>
-                                          <p:spTgt spid="28"/>
+                                          <p:spTgt spid="34"/>
                                         </p:tgtEl>
                                         <p:attrNameLst>
                                           <p:attrName>ppt_w</p:attrName>
@@ -5045,9 +5305,9 @@
                                     </p:anim>
                                     <p:anim calcmode="lin" valueType="num">
                                       <p:cBhvr>
-                                        <p:cTn id="15" dur="500" fill="hold"/>
+                                        <p:cTn id="25" dur="500" fill="hold"/>
                                         <p:tgtEl>
-                                          <p:spTgt spid="28"/>
+                                          <p:spTgt spid="34"/>
                                         </p:tgtEl>
                                         <p:attrNameLst>
                                           <p:attrName>ppt_h</p:attrName>
@@ -5068,26 +5328,35 @@
                                     </p:anim>
                                     <p:animEffect transition="in" filter="fade">
                                       <p:cBhvr>
-                                        <p:cTn id="16" dur="500"/>
+                                        <p:cTn id="26" dur="500"/>
                                         <p:tgtEl>
-                                          <p:spTgt spid="28"/>
+                                          <p:spTgt spid="34"/>
                                         </p:tgtEl>
                                       </p:cBhvr>
                                     </p:animEffect>
                                   </p:childTnLst>
                                 </p:cTn>
                               </p:par>
+                            </p:childTnLst>
+                          </p:cTn>
+                        </p:par>
+                        <p:par>
+                          <p:cTn id="27" fill="hold">
+                            <p:stCondLst>
+                              <p:cond delay="4000"/>
+                            </p:stCondLst>
+                            <p:childTnLst>
                               <p:par>
-                                <p:cTn id="17" presetID="8" presetClass="emph" presetSubtype="0" fill="hold" nodeType="withEffect">
+                                <p:cTn id="28" presetID="8" presetClass="emph" presetSubtype="0" accel="50000" decel="50000" fill="hold" nodeType="afterEffect">
                                   <p:stCondLst>
                                     <p:cond delay="0"/>
                                   </p:stCondLst>
                                   <p:childTnLst>
-                                    <p:animRot by="4860000">
+                                    <p:animRot by="7560000">
                                       <p:cBhvr>
-                                        <p:cTn id="18" dur="1000" fill="hold"/>
+                                        <p:cTn id="29" dur="1000" fill="hold"/>
                                         <p:tgtEl>
-                                          <p:spTgt spid="19"/>
+                                          <p:spTgt spid="31"/>
                                         </p:tgtEl>
                                         <p:attrNameLst>
                                           <p:attrName>r</p:attrName>
@@ -5097,21 +5366,30 @@
                                   </p:childTnLst>
                                 </p:cTn>
                               </p:par>
+                            </p:childTnLst>
+                          </p:cTn>
+                        </p:par>
+                        <p:par>
+                          <p:cTn id="30" fill="hold">
+                            <p:stCondLst>
+                              <p:cond delay="5000"/>
+                            </p:stCondLst>
+                            <p:childTnLst>
                               <p:par>
-                                <p:cTn id="19" presetID="53" presetClass="entr" presetSubtype="16" fill="hold" grpId="0" nodeType="withEffect">
+                                <p:cTn id="31" presetID="53" presetClass="entr" presetSubtype="16" fill="hold" nodeType="afterEffect">
                                   <p:stCondLst>
                                     <p:cond delay="0"/>
                                   </p:stCondLst>
                                   <p:childTnLst>
                                     <p:set>
                                       <p:cBhvr>
-                                        <p:cTn id="20" dur="1" fill="hold">
+                                        <p:cTn id="32" dur="1" fill="hold">
                                           <p:stCondLst>
                                             <p:cond delay="0"/>
                                           </p:stCondLst>
                                         </p:cTn>
                                         <p:tgtEl>
-                                          <p:spTgt spid="29"/>
+                                          <p:spTgt spid="35"/>
                                         </p:tgtEl>
                                         <p:attrNameLst>
                                           <p:attrName>style.visibility</p:attrName>
@@ -5123,9 +5401,9 @@
                                     </p:set>
                                     <p:anim calcmode="lin" valueType="num">
                                       <p:cBhvr>
-                                        <p:cTn id="21" dur="500" fill="hold"/>
+                                        <p:cTn id="33" dur="500" fill="hold"/>
                                         <p:tgtEl>
-                                          <p:spTgt spid="29"/>
+                                          <p:spTgt spid="35"/>
                                         </p:tgtEl>
                                         <p:attrNameLst>
                                           <p:attrName>ppt_w</p:attrName>
@@ -5146,9 +5424,9 @@
                                     </p:anim>
                                     <p:anim calcmode="lin" valueType="num">
                                       <p:cBhvr>
-                                        <p:cTn id="22" dur="500" fill="hold"/>
+                                        <p:cTn id="34" dur="500" fill="hold"/>
                                         <p:tgtEl>
-                                          <p:spTgt spid="29"/>
+                                          <p:spTgt spid="35"/>
                                         </p:tgtEl>
                                         <p:attrNameLst>
                                           <p:attrName>ppt_h</p:attrName>
@@ -5169,26 +5447,35 @@
                                     </p:anim>
                                     <p:animEffect transition="in" filter="fade">
                                       <p:cBhvr>
-                                        <p:cTn id="23" dur="500"/>
+                                        <p:cTn id="35" dur="500"/>
                                         <p:tgtEl>
-                                          <p:spTgt spid="29"/>
+                                          <p:spTgt spid="35"/>
                                         </p:tgtEl>
                                       </p:cBhvr>
                                     </p:animEffect>
                                   </p:childTnLst>
                                 </p:cTn>
                               </p:par>
+                            </p:childTnLst>
+                          </p:cTn>
+                        </p:par>
+                        <p:par>
+                          <p:cTn id="36" fill="hold">
+                            <p:stCondLst>
+                              <p:cond delay="5500"/>
+                            </p:stCondLst>
+                            <p:childTnLst>
                               <p:par>
-                                <p:cTn id="24" presetID="8" presetClass="emph" presetSubtype="0" fill="hold" nodeType="withEffect">
+                                <p:cTn id="37" presetID="8" presetClass="emph" presetSubtype="0" accel="50000" decel="50000" fill="hold" nodeType="afterEffect">
                                   <p:stCondLst>
                                     <p:cond delay="0"/>
                                   </p:stCondLst>
                                   <p:childTnLst>
-                                    <p:animRot by="7560000">
+                                    <p:animRot by="9720000">
                                       <p:cBhvr>
-                                        <p:cTn id="25" dur="1000" fill="hold"/>
+                                        <p:cTn id="38" dur="1000" fill="hold"/>
                                         <p:tgtEl>
-                                          <p:spTgt spid="20"/>
+                                          <p:spTgt spid="21"/>
                                         </p:tgtEl>
                                         <p:attrNameLst>
                                           <p:attrName>r</p:attrName>
@@ -5198,21 +5485,30 @@
                                   </p:childTnLst>
                                 </p:cTn>
                               </p:par>
+                            </p:childTnLst>
+                          </p:cTn>
+                        </p:par>
+                        <p:par>
+                          <p:cTn id="39" fill="hold">
+                            <p:stCondLst>
+                              <p:cond delay="6500"/>
+                            </p:stCondLst>
+                            <p:childTnLst>
                               <p:par>
-                                <p:cTn id="26" presetID="53" presetClass="entr" presetSubtype="16" fill="hold" grpId="0" nodeType="withEffect">
+                                <p:cTn id="40" presetID="53" presetClass="entr" presetSubtype="16" fill="hold" nodeType="afterEffect">
                                   <p:stCondLst>
                                     <p:cond delay="0"/>
                                   </p:stCondLst>
                                   <p:childTnLst>
                                     <p:set>
                                       <p:cBhvr>
-                                        <p:cTn id="27" dur="1" fill="hold">
+                                        <p:cTn id="41" dur="1" fill="hold">
                                           <p:stCondLst>
                                             <p:cond delay="0"/>
                                           </p:stCondLst>
                                         </p:cTn>
                                         <p:tgtEl>
-                                          <p:spTgt spid="30"/>
+                                          <p:spTgt spid="36"/>
                                         </p:tgtEl>
                                         <p:attrNameLst>
                                           <p:attrName>style.visibility</p:attrName>
@@ -5224,9 +5520,9 @@
                                     </p:set>
                                     <p:anim calcmode="lin" valueType="num">
                                       <p:cBhvr>
-                                        <p:cTn id="28" dur="500" fill="hold"/>
+                                        <p:cTn id="42" dur="500" fill="hold"/>
                                         <p:tgtEl>
-                                          <p:spTgt spid="30"/>
+                                          <p:spTgt spid="36"/>
                                         </p:tgtEl>
                                         <p:attrNameLst>
                                           <p:attrName>ppt_w</p:attrName>
@@ -5247,9 +5543,9 @@
                                     </p:anim>
                                     <p:anim calcmode="lin" valueType="num">
                                       <p:cBhvr>
-                                        <p:cTn id="29" dur="500" fill="hold"/>
+                                        <p:cTn id="43" dur="500" fill="hold"/>
                                         <p:tgtEl>
-                                          <p:spTgt spid="30"/>
+                                          <p:spTgt spid="36"/>
                                         </p:tgtEl>
                                         <p:attrNameLst>
                                           <p:attrName>ppt_h</p:attrName>
@@ -5270,32 +5566,12 @@
                                     </p:anim>
                                     <p:animEffect transition="in" filter="fade">
                                       <p:cBhvr>
-                                        <p:cTn id="30" dur="500"/>
+                                        <p:cTn id="44" dur="500"/>
                                         <p:tgtEl>
-                                          <p:spTgt spid="30"/>
+                                          <p:spTgt spid="36"/>
                                         </p:tgtEl>
                                       </p:cBhvr>
                                     </p:animEffect>
-                                  </p:childTnLst>
-                                </p:cTn>
-                              </p:par>
-                              <p:par>
-                                <p:cTn id="31" presetID="8" presetClass="emph" presetSubtype="0" fill="hold" nodeType="withEffect">
-                                  <p:stCondLst>
-                                    <p:cond delay="0"/>
-                                  </p:stCondLst>
-                                  <p:childTnLst>
-                                    <p:animRot by="9720000">
-                                      <p:cBhvr>
-                                        <p:cTn id="32" dur="1000" fill="hold"/>
-                                        <p:tgtEl>
-                                          <p:spTgt spid="21"/>
-                                        </p:tgtEl>
-                                        <p:attrNameLst>
-                                          <p:attrName>r</p:attrName>
-                                        </p:attrNameLst>
-                                      </p:cBhvr>
-                                    </p:animRot>
                                   </p:childTnLst>
                                 </p:cTn>
                               </p:par>
@@ -5327,10 +5603,7 @@
       </p:par>
     </p:tnLst>
     <p:bldLst>
-      <p:bldP spid="27" grpId="0"/>
-      <p:bldP spid="28" grpId="0"/>
-      <p:bldP spid="29" grpId="0"/>
-      <p:bldP spid="30" grpId="0"/>
+      <p:bldP spid="32" grpId="0"/>
     </p:bldLst>
   </p:timing>
 </p:sld>

</xml_diff>